<commit_message>
Gus round 1 edits
</commit_message>
<xml_diff>
--- a/figures/dist_table.pptx
+++ b/figures/dist_table.pptx
@@ -3336,14 +3336,14 @@
           <p:nvPr>
             <p:extLst>
               <p:ext uri="{D42A27DB-BD31-4B8C-83A1-F6EECF244321}">
-                <p14:modId xmlns:p14="http://schemas.microsoft.com/office/powerpoint/2010/main" val="407753451"/>
+                <p14:modId xmlns:p14="http://schemas.microsoft.com/office/powerpoint/2010/main" val="36899528"/>
               </p:ext>
             </p:extLst>
           </p:nvPr>
         </p:nvGraphicFramePr>
         <p:xfrm>
           <a:off x="1055150" y="1767769"/>
-          <a:ext cx="5939028" cy="457200"/>
+          <a:ext cx="5710428" cy="457200"/>
         </p:xfrm>
         <a:graphic>
           <a:graphicData uri="http://schemas.openxmlformats.org/drawingml/2006/table">
@@ -3457,7 +3457,7 @@
                     </a:ext>
                   </a:extLst>
                 </a:gridCol>
-                <a:gridCol w="621792">
+                <a:gridCol w="393192">
                   <a:extLst>
                     <a:ext uri="{9D8B030D-6E8A-4147-A177-3AD203B41FA5}">
                       <a16:colId xmlns:a16="http://schemas.microsoft.com/office/drawing/2014/main" val="169124881"/>

</xml_diff>